<commit_message>
Implemented MG for node-based data. Replaced the del.f90 with del_eliminated_diffType.f90 Added stencils.f90
Added some Neumann routines to the ADI, still not finished though,
It will require modifying applyBCs or some routine to adjust the RHS.

Modified BCs to have a grid module, but I didn't remove the coordinates yet.

Deleted some files (old files from MG)
</commit_message>
<xml_diff>
--- a/__documentation/Solvers/Poisson Solver/multi-grid implementation.pptx
+++ b/__documentation/Solvers/Poisson Solver/multi-grid implementation.pptx
@@ -10,6 +10,8 @@
     <p:sldId id="261" r:id="rId4"/>
     <p:sldId id="259" r:id="rId5"/>
     <p:sldId id="260" r:id="rId6"/>
+    <p:sldId id="262" r:id="rId7"/>
+    <p:sldId id="263" r:id="rId8"/>
   </p:sldIdLst>
   <p:sldSz cx="9144000" cy="6858000" type="screen4x3"/>
   <p:notesSz cx="6858000" cy="9144000"/>
@@ -293,7 +295,7 @@
             <a:fld id="{1D8BD707-D9CF-40AE-B4C6-C98DA3205C09}" type="datetimeFigureOut">
               <a:rPr lang="en-US" smtClean="0"/>
               <a:pPr/>
-              <a:t>2/24/2015</a:t>
+              <a:t>3/8/2015</a:t>
             </a:fld>
             <a:endParaRPr lang="en-US"/>
           </a:p>
@@ -460,7 +462,7 @@
             <a:fld id="{1D8BD707-D9CF-40AE-B4C6-C98DA3205C09}" type="datetimeFigureOut">
               <a:rPr lang="en-US" smtClean="0"/>
               <a:pPr/>
-              <a:t>2/24/2015</a:t>
+              <a:t>3/8/2015</a:t>
             </a:fld>
             <a:endParaRPr lang="en-US"/>
           </a:p>
@@ -637,7 +639,7 @@
             <a:fld id="{1D8BD707-D9CF-40AE-B4C6-C98DA3205C09}" type="datetimeFigureOut">
               <a:rPr lang="en-US" smtClean="0"/>
               <a:pPr/>
-              <a:t>2/24/2015</a:t>
+              <a:t>3/8/2015</a:t>
             </a:fld>
             <a:endParaRPr lang="en-US"/>
           </a:p>
@@ -804,7 +806,7 @@
             <a:fld id="{1D8BD707-D9CF-40AE-B4C6-C98DA3205C09}" type="datetimeFigureOut">
               <a:rPr lang="en-US" smtClean="0"/>
               <a:pPr/>
-              <a:t>2/24/2015</a:t>
+              <a:t>3/8/2015</a:t>
             </a:fld>
             <a:endParaRPr lang="en-US"/>
           </a:p>
@@ -1047,7 +1049,7 @@
             <a:fld id="{1D8BD707-D9CF-40AE-B4C6-C98DA3205C09}" type="datetimeFigureOut">
               <a:rPr lang="en-US" smtClean="0"/>
               <a:pPr/>
-              <a:t>2/24/2015</a:t>
+              <a:t>3/8/2015</a:t>
             </a:fld>
             <a:endParaRPr lang="en-US"/>
           </a:p>
@@ -1332,7 +1334,7 @@
             <a:fld id="{1D8BD707-D9CF-40AE-B4C6-C98DA3205C09}" type="datetimeFigureOut">
               <a:rPr lang="en-US" smtClean="0"/>
               <a:pPr/>
-              <a:t>2/24/2015</a:t>
+              <a:t>3/8/2015</a:t>
             </a:fld>
             <a:endParaRPr lang="en-US"/>
           </a:p>
@@ -1751,7 +1753,7 @@
             <a:fld id="{1D8BD707-D9CF-40AE-B4C6-C98DA3205C09}" type="datetimeFigureOut">
               <a:rPr lang="en-US" smtClean="0"/>
               <a:pPr/>
-              <a:t>2/24/2015</a:t>
+              <a:t>3/8/2015</a:t>
             </a:fld>
             <a:endParaRPr lang="en-US"/>
           </a:p>
@@ -1866,7 +1868,7 @@
             <a:fld id="{1D8BD707-D9CF-40AE-B4C6-C98DA3205C09}" type="datetimeFigureOut">
               <a:rPr lang="en-US" smtClean="0"/>
               <a:pPr/>
-              <a:t>2/24/2015</a:t>
+              <a:t>3/8/2015</a:t>
             </a:fld>
             <a:endParaRPr lang="en-US"/>
           </a:p>
@@ -1958,7 +1960,7 @@
             <a:fld id="{1D8BD707-D9CF-40AE-B4C6-C98DA3205C09}" type="datetimeFigureOut">
               <a:rPr lang="en-US" smtClean="0"/>
               <a:pPr/>
-              <a:t>2/24/2015</a:t>
+              <a:t>3/8/2015</a:t>
             </a:fld>
             <a:endParaRPr lang="en-US"/>
           </a:p>
@@ -2232,7 +2234,7 @@
             <a:fld id="{1D8BD707-D9CF-40AE-B4C6-C98DA3205C09}" type="datetimeFigureOut">
               <a:rPr lang="en-US" smtClean="0"/>
               <a:pPr/>
-              <a:t>2/24/2015</a:t>
+              <a:t>3/8/2015</a:t>
             </a:fld>
             <a:endParaRPr lang="en-US"/>
           </a:p>
@@ -2482,7 +2484,7 @@
             <a:fld id="{1D8BD707-D9CF-40AE-B4C6-C98DA3205C09}" type="datetimeFigureOut">
               <a:rPr lang="en-US" smtClean="0"/>
               <a:pPr/>
-              <a:t>2/24/2015</a:t>
+              <a:t>3/8/2015</a:t>
             </a:fld>
             <a:endParaRPr lang="en-US"/>
           </a:p>
@@ -2692,7 +2694,7 @@
             <a:fld id="{1D8BD707-D9CF-40AE-B4C6-C98DA3205C09}" type="datetimeFigureOut">
               <a:rPr lang="en-US" smtClean="0"/>
               <a:pPr/>
-              <a:t>2/24/2015</a:t>
+              <a:t>3/8/2015</a:t>
             </a:fld>
             <a:endParaRPr lang="en-US"/>
           </a:p>
@@ -3103,15 +3105,7 @@
             </a:r>
             <a:r>
               <a:rPr lang="en-US" dirty="0" smtClean="0"/>
-              <a:t> = even, </a:t>
-            </a:r>
-            <a:r>
-              <a:rPr lang="en-US" dirty="0" smtClean="0"/>
-              <a:t>good case (</a:t>
-            </a:r>
-            <a:r>
-              <a:rPr lang="en-US" dirty="0" smtClean="0"/>
-              <a:t>divisible by 2)</a:t>
+              <a:t> = even, good case (divisible by 2)</a:t>
             </a:r>
           </a:p>
           <a:p>
@@ -3124,196 +3118,16 @@
       </p:sp>
       <p:grpSp>
         <p:nvGrpSpPr>
-          <p:cNvPr id="34" name="Group 33"/>
-          <p:cNvGrpSpPr/>
+          <p:cNvPr id="33" name="Group 32"/>
+          <p:cNvGrpSpPr>
+            <a:grpSpLocks noChangeAspect="1"/>
+          </p:cNvGrpSpPr>
           <p:nvPr/>
         </p:nvGrpSpPr>
         <p:grpSpPr>
           <a:xfrm>
-            <a:off x="487680" y="3429000"/>
-            <a:ext cx="8580120" cy="990600"/>
-            <a:chOff x="182880" y="3200400"/>
-            <a:chExt cx="8580120" cy="990600"/>
-          </a:xfrm>
-        </p:grpSpPr>
-        <p:sp>
-          <p:nvSpPr>
-            <p:cNvPr id="27" name="Rectangle 26"/>
-            <p:cNvSpPr/>
-            <p:nvPr/>
-          </p:nvSpPr>
-          <p:spPr>
-            <a:xfrm>
-              <a:off x="182880" y="3200400"/>
-              <a:ext cx="2103120" cy="990600"/>
-            </a:xfrm>
-            <a:prstGeom prst="rect">
-              <a:avLst/>
-            </a:prstGeom>
-          </p:spPr>
-          <p:style>
-            <a:lnRef idx="2">
-              <a:schemeClr val="accent2"/>
-            </a:lnRef>
-            <a:fillRef idx="1">
-              <a:schemeClr val="lt1"/>
-            </a:fillRef>
-            <a:effectRef idx="0">
-              <a:schemeClr val="accent2"/>
-            </a:effectRef>
-            <a:fontRef idx="minor">
-              <a:schemeClr val="dk1"/>
-            </a:fontRef>
-          </p:style>
-          <p:txBody>
-            <a:bodyPr rtlCol="0" anchor="ctr"/>
-            <a:lstStyle/>
-            <a:p>
-              <a:pPr algn="ctr"/>
-              <a:r>
-                <a:rPr lang="en-US" dirty="0" smtClean="0"/>
-                <a:t>O</a:t>
-              </a:r>
-              <a:endParaRPr lang="en-US" dirty="0"/>
-            </a:p>
-          </p:txBody>
-        </p:sp>
-        <p:sp>
-          <p:nvSpPr>
-            <p:cNvPr id="28" name="Rectangle 27"/>
-            <p:cNvSpPr/>
-            <p:nvPr/>
-          </p:nvSpPr>
-          <p:spPr>
-            <a:xfrm>
-              <a:off x="2286000" y="3200400"/>
-              <a:ext cx="2103120" cy="990600"/>
-            </a:xfrm>
-            <a:prstGeom prst="rect">
-              <a:avLst/>
-            </a:prstGeom>
-          </p:spPr>
-          <p:style>
-            <a:lnRef idx="2">
-              <a:schemeClr val="dk1"/>
-            </a:lnRef>
-            <a:fillRef idx="1">
-              <a:schemeClr val="lt1"/>
-            </a:fillRef>
-            <a:effectRef idx="0">
-              <a:schemeClr val="dk1"/>
-            </a:effectRef>
-            <a:fontRef idx="minor">
-              <a:schemeClr val="dk1"/>
-            </a:fontRef>
-          </p:style>
-          <p:txBody>
-            <a:bodyPr rtlCol="0" anchor="ctr"/>
-            <a:lstStyle/>
-            <a:p>
-              <a:pPr algn="ctr"/>
-              <a:r>
-                <a:rPr lang="en-US" dirty="0" smtClean="0"/>
-                <a:t>O</a:t>
-              </a:r>
-              <a:endParaRPr lang="en-US" dirty="0"/>
-            </a:p>
-          </p:txBody>
-        </p:sp>
-        <p:sp>
-          <p:nvSpPr>
-            <p:cNvPr id="30" name="Rectangle 29"/>
-            <p:cNvSpPr/>
-            <p:nvPr/>
-          </p:nvSpPr>
-          <p:spPr>
-            <a:xfrm>
-              <a:off x="4379844" y="3200400"/>
-              <a:ext cx="2560320" cy="990600"/>
-            </a:xfrm>
-            <a:prstGeom prst="rect">
-              <a:avLst/>
-            </a:prstGeom>
-          </p:spPr>
-          <p:style>
-            <a:lnRef idx="2">
-              <a:schemeClr val="dk1"/>
-            </a:lnRef>
-            <a:fillRef idx="1">
-              <a:schemeClr val="lt1"/>
-            </a:fillRef>
-            <a:effectRef idx="0">
-              <a:schemeClr val="dk1"/>
-            </a:effectRef>
-            <a:fontRef idx="minor">
-              <a:schemeClr val="dk1"/>
-            </a:fontRef>
-          </p:style>
-          <p:txBody>
-            <a:bodyPr rtlCol="0" anchor="ctr"/>
-            <a:lstStyle/>
-            <a:p>
-              <a:pPr algn="ctr"/>
-              <a:r>
-                <a:rPr lang="en-US" dirty="0" smtClean="0"/>
-                <a:t>O</a:t>
-              </a:r>
-              <a:endParaRPr lang="en-US" dirty="0"/>
-            </a:p>
-          </p:txBody>
-        </p:sp>
-        <p:sp>
-          <p:nvSpPr>
-            <p:cNvPr id="31" name="Rectangle 30"/>
-            <p:cNvSpPr/>
-            <p:nvPr/>
-          </p:nvSpPr>
-          <p:spPr>
-            <a:xfrm>
-              <a:off x="6934200" y="3200400"/>
-              <a:ext cx="1828800" cy="990600"/>
-            </a:xfrm>
-            <a:prstGeom prst="rect">
-              <a:avLst/>
-            </a:prstGeom>
-          </p:spPr>
-          <p:style>
-            <a:lnRef idx="2">
-              <a:schemeClr val="accent2"/>
-            </a:lnRef>
-            <a:fillRef idx="1">
-              <a:schemeClr val="lt1"/>
-            </a:fillRef>
-            <a:effectRef idx="0">
-              <a:schemeClr val="accent2"/>
-            </a:effectRef>
-            <a:fontRef idx="minor">
-              <a:schemeClr val="dk1"/>
-            </a:fontRef>
-          </p:style>
-          <p:txBody>
-            <a:bodyPr rtlCol="0" anchor="ctr"/>
-            <a:lstStyle/>
-            <a:p>
-              <a:pPr algn="ctr"/>
-              <a:r>
-                <a:rPr lang="en-US" dirty="0" smtClean="0"/>
-                <a:t>O</a:t>
-              </a:r>
-            </a:p>
-          </p:txBody>
-        </p:sp>
-      </p:grpSp>
-      <p:grpSp>
-        <p:nvGrpSpPr>
-          <p:cNvPr id="33" name="Group 32"/>
-          <p:cNvGrpSpPr/>
-          <p:nvPr/>
-        </p:nvGrpSpPr>
-        <p:grpSpPr>
-          <a:xfrm>
-            <a:off x="1676400" y="2133600"/>
-            <a:ext cx="7391400" cy="990600"/>
+            <a:off x="1600200" y="2133600"/>
+            <a:ext cx="6858000" cy="919113"/>
             <a:chOff x="1371600" y="2133600"/>
             <a:chExt cx="7391400" cy="990600"/>
           </a:xfrm>
@@ -3369,7 +3183,7 @@
           <p:spPr>
             <a:xfrm>
               <a:off x="2286000" y="2133600"/>
-              <a:ext cx="914400" cy="990600"/>
+              <a:ext cx="646007" cy="990600"/>
             </a:xfrm>
             <a:prstGeom prst="rect">
               <a:avLst/>
@@ -3410,8 +3224,8 @@
           </p:nvSpPr>
           <p:spPr>
             <a:xfrm>
-              <a:off x="3200400" y="2133600"/>
-              <a:ext cx="1188720" cy="990600"/>
+              <a:off x="2932007" y="2133600"/>
+              <a:ext cx="1457114" cy="990600"/>
             </a:xfrm>
             <a:prstGeom prst="rect">
               <a:avLst/>
@@ -3660,8 +3474,8 @@
         </p:nvCxnSpPr>
         <p:spPr>
           <a:xfrm rot="16200000" flipH="1">
-            <a:off x="3192780" y="2979420"/>
-            <a:ext cx="304800" cy="594360"/>
+            <a:off x="2869781" y="2931237"/>
+            <a:ext cx="449243" cy="692193"/>
           </a:xfrm>
           <a:prstGeom prst="line">
             <a:avLst/>
@@ -3693,8 +3507,8 @@
         </p:nvCxnSpPr>
         <p:spPr>
           <a:xfrm rot="5400000">
-            <a:off x="3718560" y="3048000"/>
-            <a:ext cx="304800" cy="457200"/>
+            <a:off x="3357619" y="3135593"/>
+            <a:ext cx="449243" cy="283482"/>
           </a:xfrm>
           <a:prstGeom prst="line">
             <a:avLst/>
@@ -3726,8 +3540,8 @@
         </p:nvCxnSpPr>
         <p:spPr>
           <a:xfrm rot="16200000" flipH="1">
-            <a:off x="5355204" y="2819400"/>
-            <a:ext cx="304800" cy="914400"/>
+            <a:off x="4936686" y="2846745"/>
+            <a:ext cx="449243" cy="861177"/>
           </a:xfrm>
           <a:prstGeom prst="line">
             <a:avLst/>
@@ -3759,8 +3573,8 @@
         </p:nvCxnSpPr>
         <p:spPr>
           <a:xfrm rot="5400000">
-            <a:off x="5992302" y="3096702"/>
-            <a:ext cx="304800" cy="359796"/>
+            <a:off x="5527809" y="3116800"/>
+            <a:ext cx="449243" cy="321068"/>
           </a:xfrm>
           <a:prstGeom prst="line">
             <a:avLst/>
@@ -3781,6 +3595,206 @@
           </a:fontRef>
         </p:style>
       </p:cxnSp>
+      <p:grpSp>
+        <p:nvGrpSpPr>
+          <p:cNvPr id="36" name="Group 35"/>
+          <p:cNvGrpSpPr>
+            <a:grpSpLocks noChangeAspect="1"/>
+          </p:cNvGrpSpPr>
+          <p:nvPr/>
+        </p:nvGrpSpPr>
+        <p:grpSpPr>
+          <a:xfrm>
+            <a:off x="518160" y="3501956"/>
+            <a:ext cx="8625840" cy="917643"/>
+            <a:chOff x="487680" y="3429000"/>
+            <a:chExt cx="9311640" cy="990600"/>
+          </a:xfrm>
+        </p:grpSpPr>
+        <p:grpSp>
+          <p:nvGrpSpPr>
+            <p:cNvPr id="34" name="Group 33"/>
+            <p:cNvGrpSpPr/>
+            <p:nvPr/>
+          </p:nvGrpSpPr>
+          <p:grpSpPr>
+            <a:xfrm>
+              <a:off x="487680" y="3429000"/>
+              <a:ext cx="6757284" cy="990600"/>
+              <a:chOff x="182880" y="3200400"/>
+              <a:chExt cx="6757284" cy="990600"/>
+            </a:xfrm>
+          </p:grpSpPr>
+          <p:sp>
+            <p:nvSpPr>
+              <p:cNvPr id="27" name="Rectangle 26"/>
+              <p:cNvSpPr/>
+              <p:nvPr/>
+            </p:nvSpPr>
+            <p:spPr>
+              <a:xfrm>
+                <a:off x="182880" y="3200400"/>
+                <a:ext cx="2103120" cy="990600"/>
+              </a:xfrm>
+              <a:prstGeom prst="rect">
+                <a:avLst/>
+              </a:prstGeom>
+            </p:spPr>
+            <p:style>
+              <a:lnRef idx="2">
+                <a:schemeClr val="accent2"/>
+              </a:lnRef>
+              <a:fillRef idx="1">
+                <a:schemeClr val="lt1"/>
+              </a:fillRef>
+              <a:effectRef idx="0">
+                <a:schemeClr val="accent2"/>
+              </a:effectRef>
+              <a:fontRef idx="minor">
+                <a:schemeClr val="dk1"/>
+              </a:fontRef>
+            </p:style>
+            <p:txBody>
+              <a:bodyPr rtlCol="0" anchor="ctr"/>
+              <a:lstStyle/>
+              <a:p>
+                <a:pPr algn="ctr"/>
+                <a:r>
+                  <a:rPr lang="en-US" dirty="0" smtClean="0"/>
+                  <a:t>O</a:t>
+                </a:r>
+                <a:endParaRPr lang="en-US" dirty="0"/>
+              </a:p>
+            </p:txBody>
+          </p:sp>
+          <p:sp>
+            <p:nvSpPr>
+              <p:cNvPr id="28" name="Rectangle 27"/>
+              <p:cNvSpPr/>
+              <p:nvPr/>
+            </p:nvSpPr>
+            <p:spPr>
+              <a:xfrm>
+                <a:off x="2286000" y="3200400"/>
+                <a:ext cx="2103120" cy="990600"/>
+              </a:xfrm>
+              <a:prstGeom prst="rect">
+                <a:avLst/>
+              </a:prstGeom>
+            </p:spPr>
+            <p:style>
+              <a:lnRef idx="2">
+                <a:schemeClr val="dk1"/>
+              </a:lnRef>
+              <a:fillRef idx="1">
+                <a:schemeClr val="lt1"/>
+              </a:fillRef>
+              <a:effectRef idx="0">
+                <a:schemeClr val="dk1"/>
+              </a:effectRef>
+              <a:fontRef idx="minor">
+                <a:schemeClr val="dk1"/>
+              </a:fontRef>
+            </p:style>
+            <p:txBody>
+              <a:bodyPr rtlCol="0" anchor="ctr"/>
+              <a:lstStyle/>
+              <a:p>
+                <a:pPr algn="ctr"/>
+                <a:r>
+                  <a:rPr lang="en-US" dirty="0" smtClean="0"/>
+                  <a:t>O</a:t>
+                </a:r>
+                <a:endParaRPr lang="en-US" dirty="0"/>
+              </a:p>
+            </p:txBody>
+          </p:sp>
+          <p:sp>
+            <p:nvSpPr>
+              <p:cNvPr id="30" name="Rectangle 29"/>
+              <p:cNvSpPr/>
+              <p:nvPr/>
+            </p:nvSpPr>
+            <p:spPr>
+              <a:xfrm>
+                <a:off x="4379844" y="3200400"/>
+                <a:ext cx="2560320" cy="990600"/>
+              </a:xfrm>
+              <a:prstGeom prst="rect">
+                <a:avLst/>
+              </a:prstGeom>
+            </p:spPr>
+            <p:style>
+              <a:lnRef idx="2">
+                <a:schemeClr val="dk1"/>
+              </a:lnRef>
+              <a:fillRef idx="1">
+                <a:schemeClr val="lt1"/>
+              </a:fillRef>
+              <a:effectRef idx="0">
+                <a:schemeClr val="dk1"/>
+              </a:effectRef>
+              <a:fontRef idx="minor">
+                <a:schemeClr val="dk1"/>
+              </a:fontRef>
+            </p:style>
+            <p:txBody>
+              <a:bodyPr rtlCol="0" anchor="ctr"/>
+              <a:lstStyle/>
+              <a:p>
+                <a:pPr algn="ctr"/>
+                <a:r>
+                  <a:rPr lang="en-US" dirty="0" smtClean="0"/>
+                  <a:t>O</a:t>
+                </a:r>
+                <a:endParaRPr lang="en-US" dirty="0"/>
+              </a:p>
+            </p:txBody>
+          </p:sp>
+        </p:grpSp>
+        <p:sp>
+          <p:nvSpPr>
+            <p:cNvPr id="29" name="Rectangle 28"/>
+            <p:cNvSpPr/>
+            <p:nvPr/>
+          </p:nvSpPr>
+          <p:spPr>
+            <a:xfrm>
+              <a:off x="7239000" y="3429000"/>
+              <a:ext cx="2560320" cy="990600"/>
+            </a:xfrm>
+            <a:prstGeom prst="rect">
+              <a:avLst/>
+            </a:prstGeom>
+          </p:spPr>
+          <p:style>
+            <a:lnRef idx="2">
+              <a:schemeClr val="accent2"/>
+            </a:lnRef>
+            <a:fillRef idx="1">
+              <a:schemeClr val="lt1"/>
+            </a:fillRef>
+            <a:effectRef idx="0">
+              <a:schemeClr val="accent2"/>
+            </a:effectRef>
+            <a:fontRef idx="minor">
+              <a:schemeClr val="dk1"/>
+            </a:fontRef>
+          </p:style>
+          <p:txBody>
+            <a:bodyPr rtlCol="0" anchor="ctr"/>
+            <a:lstStyle/>
+            <a:p>
+              <a:pPr algn="ctr"/>
+              <a:r>
+                <a:rPr lang="en-US" dirty="0" smtClean="0"/>
+                <a:t>O</a:t>
+              </a:r>
+              <a:endParaRPr lang="en-US" dirty="0"/>
+            </a:p>
+          </p:txBody>
+        </p:sp>
+      </p:grpSp>
     </p:spTree>
   </p:cSld>
   <p:clrMapOvr>
@@ -4689,11 +4703,7 @@
           <a:p>
             <a:r>
               <a:rPr lang="en-US" dirty="0" smtClean="0"/>
-              <a:t>Node </a:t>
-            </a:r>
-            <a:r>
-              <a:rPr lang="en-US" dirty="0" smtClean="0"/>
-              <a:t>data</a:t>
+              <a:t>Node data</a:t>
             </a:r>
           </a:p>
           <a:p>
@@ -4703,25 +4713,8 @@
             </a:r>
             <a:r>
               <a:rPr lang="en-US" dirty="0" smtClean="0"/>
-              <a:t> </a:t>
-            </a:r>
-            <a:r>
-              <a:rPr lang="en-US" dirty="0" smtClean="0"/>
-              <a:t>= </a:t>
-            </a:r>
-            <a:r>
-              <a:rPr lang="en-US" dirty="0" smtClean="0"/>
-              <a:t>odd, good case (cells divisible </a:t>
-            </a:r>
-            <a:r>
-              <a:rPr lang="en-US" dirty="0" smtClean="0"/>
-              <a:t>by 2</a:t>
-            </a:r>
-            <a:r>
-              <a:rPr lang="en-US" dirty="0" smtClean="0"/>
-              <a:t>)</a:t>
-            </a:r>
-            <a:endParaRPr lang="en-US" dirty="0" smtClean="0"/>
+              <a:t> = odd, good case (cells divisible by 2)</a:t>
+            </a:r>
           </a:p>
         </p:txBody>
       </p:sp>
@@ -5441,7 +5434,6 @@
               <a:rPr lang="en-US" dirty="0" smtClean="0"/>
               <a:t>Node data</a:t>
             </a:r>
-            <a:endParaRPr lang="en-US" dirty="0" smtClean="0"/>
           </a:p>
           <a:p>
             <a:r>
@@ -5450,11 +5442,7 @@
             </a:r>
             <a:r>
               <a:rPr lang="en-US" dirty="0" smtClean="0"/>
-              <a:t> </a:t>
-            </a:r>
-            <a:r>
-              <a:rPr lang="en-US" dirty="0" smtClean="0"/>
-              <a:t>= odd, issue</a:t>
+              <a:t> = odd, issue</a:t>
             </a:r>
           </a:p>
           <a:p>
@@ -6209,6 +6197,734 @@
             <a:r>
               <a:rPr lang="en-US" dirty="0" smtClean="0"/>
               <a:t>https://www10.informatik.uni-erlangen.de/Publications/Theses/2007/Bergler_DA_07.pdf</a:t>
+            </a:r>
+            <a:endParaRPr lang="en-US" dirty="0"/>
+          </a:p>
+        </p:txBody>
+      </p:sp>
+    </p:spTree>
+  </p:cSld>
+  <p:clrMapOvr>
+    <a:masterClrMapping/>
+  </p:clrMapOvr>
+</p:sld>
+</file>
+
+<file path=ppt/slides/slide6.xml><?xml version="1.0" encoding="utf-8"?>
+<p:sld xmlns:a="http://schemas.openxmlformats.org/drawingml/2006/main" xmlns:r="http://schemas.openxmlformats.org/officeDocument/2006/relationships" xmlns:p="http://schemas.openxmlformats.org/presentationml/2006/main">
+  <p:cSld>
+    <p:spTree>
+      <p:nvGrpSpPr>
+        <p:cNvPr id="1" name=""/>
+        <p:cNvGrpSpPr/>
+        <p:nvPr/>
+      </p:nvGrpSpPr>
+      <p:grpSpPr>
+        <a:xfrm>
+          <a:off x="0" y="0"/>
+          <a:ext cx="0" cy="0"/>
+          <a:chOff x="0" y="0"/>
+          <a:chExt cx="0" cy="0"/>
+        </a:xfrm>
+      </p:grpSpPr>
+      <p:sp>
+        <p:nvSpPr>
+          <p:cNvPr id="2" name="Oval 1"/>
+          <p:cNvSpPr/>
+          <p:nvPr/>
+        </p:nvSpPr>
+        <p:spPr>
+          <a:xfrm>
+            <a:off x="4191000" y="0"/>
+            <a:ext cx="1447800" cy="914400"/>
+          </a:xfrm>
+          <a:prstGeom prst="ellipse">
+            <a:avLst/>
+          </a:prstGeom>
+        </p:spPr>
+        <p:style>
+          <a:lnRef idx="2">
+            <a:schemeClr val="accent6"/>
+          </a:lnRef>
+          <a:fillRef idx="1">
+            <a:schemeClr val="lt1"/>
+          </a:fillRef>
+          <a:effectRef idx="0">
+            <a:schemeClr val="accent6"/>
+          </a:effectRef>
+          <a:fontRef idx="minor">
+            <a:schemeClr val="dk1"/>
+          </a:fontRef>
+        </p:style>
+        <p:txBody>
+          <a:bodyPr rtlCol="0" anchor="ctr"/>
+          <a:lstStyle/>
+          <a:p>
+            <a:pPr algn="ctr"/>
+            <a:r>
+              <a:rPr lang="en-US" dirty="0" smtClean="0"/>
+              <a:t>Init base grid</a:t>
+            </a:r>
+            <a:endParaRPr lang="en-US" dirty="0"/>
+          </a:p>
+        </p:txBody>
+      </p:sp>
+      <p:sp>
+        <p:nvSpPr>
+          <p:cNvPr id="3" name="TextBox 2"/>
+          <p:cNvSpPr txBox="1"/>
+          <p:nvPr/>
+        </p:nvSpPr>
+        <p:spPr>
+          <a:xfrm>
+            <a:off x="0" y="0"/>
+            <a:ext cx="3007233" cy="1323439"/>
+          </a:xfrm>
+          <a:prstGeom prst="rect">
+            <a:avLst/>
+          </a:prstGeom>
+          <a:noFill/>
+        </p:spPr>
+        <p:txBody>
+          <a:bodyPr wrap="none" rtlCol="0">
+            <a:spAutoFit/>
+          </a:bodyPr>
+          <a:lstStyle/>
+          <a:p>
+            <a:r>
+              <a:rPr lang="en-US" sz="4000" dirty="0" smtClean="0"/>
+              <a:t>Flow Chart</a:t>
+            </a:r>
+          </a:p>
+          <a:p>
+            <a:r>
+              <a:rPr lang="en-US" sz="4000" dirty="0" smtClean="0"/>
+              <a:t>-Test routines</a:t>
+            </a:r>
+          </a:p>
+        </p:txBody>
+      </p:sp>
+      <p:sp>
+        <p:nvSpPr>
+          <p:cNvPr id="4" name="Rectangle 3"/>
+          <p:cNvSpPr/>
+          <p:nvPr/>
+        </p:nvSpPr>
+        <p:spPr>
+          <a:xfrm>
+            <a:off x="3962400" y="1295400"/>
+            <a:ext cx="1828800" cy="762000"/>
+          </a:xfrm>
+          <a:prstGeom prst="rect">
+            <a:avLst/>
+          </a:prstGeom>
+        </p:spPr>
+        <p:style>
+          <a:lnRef idx="2">
+            <a:schemeClr val="accent6"/>
+          </a:lnRef>
+          <a:fillRef idx="1">
+            <a:schemeClr val="lt1"/>
+          </a:fillRef>
+          <a:effectRef idx="0">
+            <a:schemeClr val="accent6"/>
+          </a:effectRef>
+          <a:fontRef idx="minor">
+            <a:schemeClr val="dk1"/>
+          </a:fontRef>
+        </p:style>
+        <p:txBody>
+          <a:bodyPr rtlCol="0" anchor="ctr"/>
+          <a:lstStyle/>
+          <a:p>
+            <a:pPr algn="ctr"/>
+            <a:r>
+              <a:rPr lang="en-US" dirty="0" smtClean="0"/>
+              <a:t>Init restricted grids</a:t>
+            </a:r>
+            <a:endParaRPr lang="en-US" dirty="0"/>
+          </a:p>
+        </p:txBody>
+      </p:sp>
+      <p:sp>
+        <p:nvSpPr>
+          <p:cNvPr id="5" name="Rectangle 4"/>
+          <p:cNvSpPr/>
+          <p:nvPr/>
+        </p:nvSpPr>
+        <p:spPr>
+          <a:xfrm>
+            <a:off x="3962400" y="2438400"/>
+            <a:ext cx="1828800" cy="762000"/>
+          </a:xfrm>
+          <a:prstGeom prst="rect">
+            <a:avLst/>
+          </a:prstGeom>
+        </p:spPr>
+        <p:style>
+          <a:lnRef idx="2">
+            <a:schemeClr val="accent6"/>
+          </a:lnRef>
+          <a:fillRef idx="1">
+            <a:schemeClr val="lt1"/>
+          </a:fillRef>
+          <a:effectRef idx="0">
+            <a:schemeClr val="accent6"/>
+          </a:effectRef>
+          <a:fontRef idx="minor">
+            <a:schemeClr val="dk1"/>
+          </a:fontRef>
+        </p:style>
+        <p:txBody>
+          <a:bodyPr rtlCol="0" anchor="ctr"/>
+          <a:lstStyle/>
+          <a:p>
+            <a:pPr algn="ctr"/>
+            <a:r>
+              <a:rPr lang="en-US" dirty="0" smtClean="0"/>
+              <a:t>Restrict f to coarse grids</a:t>
+            </a:r>
+            <a:endParaRPr lang="en-US" dirty="0"/>
+          </a:p>
+        </p:txBody>
+      </p:sp>
+      <p:sp>
+        <p:nvSpPr>
+          <p:cNvPr id="6" name="Rectangle 5"/>
+          <p:cNvSpPr/>
+          <p:nvPr/>
+        </p:nvSpPr>
+        <p:spPr>
+          <a:xfrm>
+            <a:off x="3962400" y="3429000"/>
+            <a:ext cx="1828800" cy="762000"/>
+          </a:xfrm>
+          <a:prstGeom prst="rect">
+            <a:avLst/>
+          </a:prstGeom>
+        </p:spPr>
+        <p:style>
+          <a:lnRef idx="2">
+            <a:schemeClr val="accent6"/>
+          </a:lnRef>
+          <a:fillRef idx="1">
+            <a:schemeClr val="lt1"/>
+          </a:fillRef>
+          <a:effectRef idx="0">
+            <a:schemeClr val="accent6"/>
+          </a:effectRef>
+          <a:fontRef idx="minor">
+            <a:schemeClr val="dk1"/>
+          </a:fontRef>
+        </p:style>
+        <p:txBody>
+          <a:bodyPr rtlCol="0" anchor="ctr"/>
+          <a:lstStyle/>
+          <a:p>
+            <a:pPr algn="ctr"/>
+            <a:r>
+              <a:rPr lang="en-US" dirty="0" err="1" smtClean="0"/>
+              <a:t>Prolongate</a:t>
+            </a:r>
+            <a:r>
+              <a:rPr lang="en-US" dirty="0" smtClean="0"/>
+              <a:t> f back to fine grids</a:t>
+            </a:r>
+            <a:endParaRPr lang="en-US" dirty="0"/>
+          </a:p>
+        </p:txBody>
+      </p:sp>
+    </p:spTree>
+  </p:cSld>
+  <p:clrMapOvr>
+    <a:masterClrMapping/>
+  </p:clrMapOvr>
+</p:sld>
+</file>
+
+<file path=ppt/slides/slide7.xml><?xml version="1.0" encoding="utf-8"?>
+<p:sld xmlns:a="http://schemas.openxmlformats.org/drawingml/2006/main" xmlns:r="http://schemas.openxmlformats.org/officeDocument/2006/relationships" xmlns:p="http://schemas.openxmlformats.org/presentationml/2006/main">
+  <p:cSld>
+    <p:spTree>
+      <p:nvGrpSpPr>
+        <p:cNvPr id="1" name=""/>
+        <p:cNvGrpSpPr/>
+        <p:nvPr/>
+      </p:nvGrpSpPr>
+      <p:grpSpPr>
+        <a:xfrm>
+          <a:off x="0" y="0"/>
+          <a:ext cx="0" cy="0"/>
+          <a:chOff x="0" y="0"/>
+          <a:chExt cx="0" cy="0"/>
+        </a:xfrm>
+      </p:grpSpPr>
+      <p:sp>
+        <p:nvSpPr>
+          <p:cNvPr id="3" name="TextBox 2"/>
+          <p:cNvSpPr txBox="1"/>
+          <p:nvPr/>
+        </p:nvSpPr>
+        <p:spPr>
+          <a:xfrm>
+            <a:off x="0" y="0"/>
+            <a:ext cx="3352800" cy="1323439"/>
+          </a:xfrm>
+          <a:prstGeom prst="rect">
+            <a:avLst/>
+          </a:prstGeom>
+          <a:noFill/>
+        </p:spPr>
+        <p:txBody>
+          <a:bodyPr wrap="square" rtlCol="0">
+            <a:spAutoFit/>
+          </a:bodyPr>
+          <a:lstStyle/>
+          <a:p>
+            <a:r>
+              <a:rPr lang="en-US" sz="4000" dirty="0" smtClean="0"/>
+              <a:t>Flow Chart</a:t>
+            </a:r>
+          </a:p>
+          <a:p>
+            <a:r>
+              <a:rPr lang="en-US" sz="4000" dirty="0" smtClean="0"/>
+              <a:t>-MG levels/def</a:t>
+            </a:r>
+          </a:p>
+        </p:txBody>
+      </p:sp>
+      <p:sp>
+        <p:nvSpPr>
+          <p:cNvPr id="4" name="Rectangle 3"/>
+          <p:cNvSpPr/>
+          <p:nvPr/>
+        </p:nvSpPr>
+        <p:spPr>
+          <a:xfrm>
+            <a:off x="1371600" y="5105400"/>
+            <a:ext cx="1828800" cy="762000"/>
+          </a:xfrm>
+          <a:prstGeom prst="rect">
+            <a:avLst/>
+          </a:prstGeom>
+        </p:spPr>
+        <p:style>
+          <a:lnRef idx="2">
+            <a:schemeClr val="accent6"/>
+          </a:lnRef>
+          <a:fillRef idx="1">
+            <a:schemeClr val="lt1"/>
+          </a:fillRef>
+          <a:effectRef idx="0">
+            <a:schemeClr val="accent6"/>
+          </a:effectRef>
+          <a:fontRef idx="minor">
+            <a:schemeClr val="dk1"/>
+          </a:fontRef>
+        </p:style>
+        <p:txBody>
+          <a:bodyPr rtlCol="0" anchor="ctr"/>
+          <a:lstStyle/>
+          <a:p>
+            <a:pPr algn="ctr"/>
+            <a:r>
+              <a:rPr lang="en-US" dirty="0" err="1" smtClean="0"/>
+              <a:t>u,lap</a:t>
+            </a:r>
+            <a:r>
+              <a:rPr lang="en-US" dirty="0" smtClean="0"/>
+              <a:t>(u),</a:t>
+            </a:r>
+            <a:r>
+              <a:rPr lang="en-US" dirty="0" err="1" smtClean="0"/>
+              <a:t>res,f,e</a:t>
+            </a:r>
+            <a:endParaRPr lang="en-US" dirty="0"/>
+          </a:p>
+        </p:txBody>
+      </p:sp>
+      <p:sp>
+        <p:nvSpPr>
+          <p:cNvPr id="7" name="Rectangle 6"/>
+          <p:cNvSpPr/>
+          <p:nvPr/>
+        </p:nvSpPr>
+        <p:spPr>
+          <a:xfrm>
+            <a:off x="2209800" y="3505200"/>
+            <a:ext cx="1828800" cy="762000"/>
+          </a:xfrm>
+          <a:prstGeom prst="rect">
+            <a:avLst/>
+          </a:prstGeom>
+        </p:spPr>
+        <p:style>
+          <a:lnRef idx="2">
+            <a:schemeClr val="accent6"/>
+          </a:lnRef>
+          <a:fillRef idx="1">
+            <a:schemeClr val="lt1"/>
+          </a:fillRef>
+          <a:effectRef idx="0">
+            <a:schemeClr val="accent6"/>
+          </a:effectRef>
+          <a:fontRef idx="minor">
+            <a:schemeClr val="dk1"/>
+          </a:fontRef>
+        </p:style>
+        <p:txBody>
+          <a:bodyPr rtlCol="0" anchor="ctr"/>
+          <a:lstStyle/>
+          <a:p>
+            <a:pPr algn="ctr"/>
+            <a:r>
+              <a:rPr lang="en-US" dirty="0" err="1" smtClean="0"/>
+              <a:t>u,lap</a:t>
+            </a:r>
+            <a:r>
+              <a:rPr lang="en-US" dirty="0" smtClean="0"/>
+              <a:t>(u),</a:t>
+            </a:r>
+            <a:r>
+              <a:rPr lang="en-US" dirty="0" err="1" smtClean="0"/>
+              <a:t>res,f,e</a:t>
+            </a:r>
+            <a:endParaRPr lang="en-US" dirty="0"/>
+          </a:p>
+        </p:txBody>
+      </p:sp>
+      <p:cxnSp>
+        <p:nvCxnSpPr>
+          <p:cNvPr id="9" name="Straight Arrow Connector 8"/>
+          <p:cNvCxnSpPr>
+            <a:stCxn id="4" idx="0"/>
+            <a:endCxn id="7" idx="2"/>
+          </p:cNvCxnSpPr>
+          <p:nvPr/>
+        </p:nvCxnSpPr>
+        <p:spPr>
+          <a:xfrm rot="5400000" flipH="1" flipV="1">
+            <a:off x="2286000" y="4267200"/>
+            <a:ext cx="838200" cy="838200"/>
+          </a:xfrm>
+          <a:prstGeom prst="straightConnector1">
+            <a:avLst/>
+          </a:prstGeom>
+          <a:ln>
+            <a:tailEnd type="arrow"/>
+          </a:ln>
+        </p:spPr>
+        <p:style>
+          <a:lnRef idx="2">
+            <a:schemeClr val="accent1"/>
+          </a:lnRef>
+          <a:fillRef idx="0">
+            <a:schemeClr val="accent1"/>
+          </a:fillRef>
+          <a:effectRef idx="1">
+            <a:schemeClr val="accent1"/>
+          </a:effectRef>
+          <a:fontRef idx="minor">
+            <a:schemeClr val="tx1"/>
+          </a:fontRef>
+        </p:style>
+      </p:cxnSp>
+      <p:sp>
+        <p:nvSpPr>
+          <p:cNvPr id="12" name="Rectangle 11"/>
+          <p:cNvSpPr/>
+          <p:nvPr/>
+        </p:nvSpPr>
+        <p:spPr>
+          <a:xfrm>
+            <a:off x="3657600" y="1905000"/>
+            <a:ext cx="1828800" cy="762000"/>
+          </a:xfrm>
+          <a:prstGeom prst="rect">
+            <a:avLst/>
+          </a:prstGeom>
+        </p:spPr>
+        <p:style>
+          <a:lnRef idx="2">
+            <a:schemeClr val="accent6"/>
+          </a:lnRef>
+          <a:fillRef idx="1">
+            <a:schemeClr val="lt1"/>
+          </a:fillRef>
+          <a:effectRef idx="0">
+            <a:schemeClr val="accent6"/>
+          </a:effectRef>
+          <a:fontRef idx="minor">
+            <a:schemeClr val="dk1"/>
+          </a:fontRef>
+        </p:style>
+        <p:txBody>
+          <a:bodyPr rtlCol="0" anchor="ctr"/>
+          <a:lstStyle/>
+          <a:p>
+            <a:pPr algn="ctr"/>
+            <a:r>
+              <a:rPr lang="en-US" dirty="0" err="1" smtClean="0"/>
+              <a:t>u,lap</a:t>
+            </a:r>
+            <a:r>
+              <a:rPr lang="en-US" dirty="0" smtClean="0"/>
+              <a:t>(u),</a:t>
+            </a:r>
+            <a:r>
+              <a:rPr lang="en-US" dirty="0" err="1" smtClean="0"/>
+              <a:t>res,f,e</a:t>
+            </a:r>
+            <a:endParaRPr lang="en-US" dirty="0"/>
+          </a:p>
+        </p:txBody>
+      </p:sp>
+      <p:cxnSp>
+        <p:nvCxnSpPr>
+          <p:cNvPr id="13" name="Straight Arrow Connector 12"/>
+          <p:cNvCxnSpPr>
+            <a:stCxn id="7" idx="0"/>
+            <a:endCxn id="12" idx="2"/>
+          </p:cNvCxnSpPr>
+          <p:nvPr/>
+        </p:nvCxnSpPr>
+        <p:spPr>
+          <a:xfrm rot="5400000" flipH="1" flipV="1">
+            <a:off x="3429000" y="2362200"/>
+            <a:ext cx="838200" cy="1447800"/>
+          </a:xfrm>
+          <a:prstGeom prst="straightConnector1">
+            <a:avLst/>
+          </a:prstGeom>
+          <a:ln>
+            <a:tailEnd type="arrow"/>
+          </a:ln>
+        </p:spPr>
+        <p:style>
+          <a:lnRef idx="2">
+            <a:schemeClr val="accent1"/>
+          </a:lnRef>
+          <a:fillRef idx="0">
+            <a:schemeClr val="accent1"/>
+          </a:fillRef>
+          <a:effectRef idx="1">
+            <a:schemeClr val="accent1"/>
+          </a:effectRef>
+          <a:fontRef idx="minor">
+            <a:schemeClr val="tx1"/>
+          </a:fontRef>
+        </p:style>
+      </p:cxnSp>
+      <p:sp>
+        <p:nvSpPr>
+          <p:cNvPr id="17" name="Rectangle 16"/>
+          <p:cNvSpPr/>
+          <p:nvPr/>
+        </p:nvSpPr>
+        <p:spPr>
+          <a:xfrm>
+            <a:off x="5257800" y="3505200"/>
+            <a:ext cx="1828800" cy="762000"/>
+          </a:xfrm>
+          <a:prstGeom prst="rect">
+            <a:avLst/>
+          </a:prstGeom>
+        </p:spPr>
+        <p:style>
+          <a:lnRef idx="2">
+            <a:schemeClr val="accent6"/>
+          </a:lnRef>
+          <a:fillRef idx="1">
+            <a:schemeClr val="lt1"/>
+          </a:fillRef>
+          <a:effectRef idx="0">
+            <a:schemeClr val="accent6"/>
+          </a:effectRef>
+          <a:fontRef idx="minor">
+            <a:schemeClr val="dk1"/>
+          </a:fontRef>
+        </p:style>
+        <p:txBody>
+          <a:bodyPr rtlCol="0" anchor="ctr"/>
+          <a:lstStyle/>
+          <a:p>
+            <a:pPr algn="ctr"/>
+            <a:r>
+              <a:rPr lang="en-US" dirty="0" err="1" smtClean="0"/>
+              <a:t>u,lap</a:t>
+            </a:r>
+            <a:r>
+              <a:rPr lang="en-US" dirty="0" smtClean="0"/>
+              <a:t>(u),</a:t>
+            </a:r>
+            <a:r>
+              <a:rPr lang="en-US" dirty="0" err="1" smtClean="0"/>
+              <a:t>res,f,e</a:t>
+            </a:r>
+            <a:endParaRPr lang="en-US" dirty="0"/>
+          </a:p>
+        </p:txBody>
+      </p:sp>
+      <p:sp>
+        <p:nvSpPr>
+          <p:cNvPr id="18" name="Rectangle 17"/>
+          <p:cNvSpPr/>
+          <p:nvPr/>
+        </p:nvSpPr>
+        <p:spPr>
+          <a:xfrm>
+            <a:off x="6400800" y="5105400"/>
+            <a:ext cx="1828800" cy="762000"/>
+          </a:xfrm>
+          <a:prstGeom prst="rect">
+            <a:avLst/>
+          </a:prstGeom>
+        </p:spPr>
+        <p:style>
+          <a:lnRef idx="2">
+            <a:schemeClr val="accent6"/>
+          </a:lnRef>
+          <a:fillRef idx="1">
+            <a:schemeClr val="lt1"/>
+          </a:fillRef>
+          <a:effectRef idx="0">
+            <a:schemeClr val="accent6"/>
+          </a:effectRef>
+          <a:fontRef idx="minor">
+            <a:schemeClr val="dk1"/>
+          </a:fontRef>
+        </p:style>
+        <p:txBody>
+          <a:bodyPr rtlCol="0" anchor="ctr"/>
+          <a:lstStyle/>
+          <a:p>
+            <a:pPr algn="ctr"/>
+            <a:r>
+              <a:rPr lang="en-US" dirty="0" err="1" smtClean="0"/>
+              <a:t>u,lap</a:t>
+            </a:r>
+            <a:r>
+              <a:rPr lang="en-US" dirty="0" smtClean="0"/>
+              <a:t>(u),</a:t>
+            </a:r>
+            <a:r>
+              <a:rPr lang="en-US" dirty="0" err="1" smtClean="0"/>
+              <a:t>res,f,e</a:t>
+            </a:r>
+            <a:endParaRPr lang="en-US" dirty="0"/>
+          </a:p>
+        </p:txBody>
+      </p:sp>
+      <p:cxnSp>
+        <p:nvCxnSpPr>
+          <p:cNvPr id="19" name="Straight Arrow Connector 18"/>
+          <p:cNvCxnSpPr>
+            <a:stCxn id="12" idx="2"/>
+            <a:endCxn id="17" idx="0"/>
+          </p:cNvCxnSpPr>
+          <p:nvPr/>
+        </p:nvCxnSpPr>
+        <p:spPr>
+          <a:xfrm rot="16200000" flipH="1">
+            <a:off x="4953000" y="2286000"/>
+            <a:ext cx="838200" cy="1600200"/>
+          </a:xfrm>
+          <a:prstGeom prst="straightConnector1">
+            <a:avLst/>
+          </a:prstGeom>
+          <a:ln>
+            <a:tailEnd type="arrow"/>
+          </a:ln>
+        </p:spPr>
+        <p:style>
+          <a:lnRef idx="2">
+            <a:schemeClr val="accent1"/>
+          </a:lnRef>
+          <a:fillRef idx="0">
+            <a:schemeClr val="accent1"/>
+          </a:fillRef>
+          <a:effectRef idx="1">
+            <a:schemeClr val="accent1"/>
+          </a:effectRef>
+          <a:fontRef idx="minor">
+            <a:schemeClr val="tx1"/>
+          </a:fontRef>
+        </p:style>
+      </p:cxnSp>
+      <p:cxnSp>
+        <p:nvCxnSpPr>
+          <p:cNvPr id="22" name="Straight Arrow Connector 21"/>
+          <p:cNvCxnSpPr>
+            <a:stCxn id="17" idx="2"/>
+            <a:endCxn id="18" idx="0"/>
+          </p:cNvCxnSpPr>
+          <p:nvPr/>
+        </p:nvCxnSpPr>
+        <p:spPr>
+          <a:xfrm rot="16200000" flipH="1">
+            <a:off x="6324600" y="4114800"/>
+            <a:ext cx="838200" cy="1143000"/>
+          </a:xfrm>
+          <a:prstGeom prst="straightConnector1">
+            <a:avLst/>
+          </a:prstGeom>
+          <a:ln>
+            <a:tailEnd type="arrow"/>
+          </a:ln>
+        </p:spPr>
+        <p:style>
+          <a:lnRef idx="2">
+            <a:schemeClr val="accent1"/>
+          </a:lnRef>
+          <a:fillRef idx="0">
+            <a:schemeClr val="accent1"/>
+          </a:fillRef>
+          <a:effectRef idx="1">
+            <a:schemeClr val="accent1"/>
+          </a:effectRef>
+          <a:fontRef idx="minor">
+            <a:schemeClr val="tx1"/>
+          </a:fontRef>
+        </p:style>
+      </p:cxnSp>
+      <p:sp>
+        <p:nvSpPr>
+          <p:cNvPr id="25" name="Rectangle 24"/>
+          <p:cNvSpPr/>
+          <p:nvPr/>
+        </p:nvSpPr>
+        <p:spPr>
+          <a:xfrm>
+            <a:off x="3581400" y="4876800"/>
+            <a:ext cx="457200" cy="381000"/>
+          </a:xfrm>
+          <a:prstGeom prst="rect">
+            <a:avLst/>
+          </a:prstGeom>
+        </p:spPr>
+        <p:style>
+          <a:lnRef idx="2">
+            <a:schemeClr val="accent6"/>
+          </a:lnRef>
+          <a:fillRef idx="1">
+            <a:schemeClr val="lt1"/>
+          </a:fillRef>
+          <a:effectRef idx="0">
+            <a:schemeClr val="accent6"/>
+          </a:effectRef>
+          <a:fontRef idx="minor">
+            <a:schemeClr val="dk1"/>
+          </a:fontRef>
+        </p:style>
+        <p:txBody>
+          <a:bodyPr rtlCol="0" anchor="ctr"/>
+          <a:lstStyle/>
+          <a:p>
+            <a:pPr algn="ctr"/>
+            <a:r>
+              <a:rPr lang="en-US" dirty="0" smtClean="0"/>
+              <a:t>e</a:t>
             </a:r>
             <a:endParaRPr lang="en-US" dirty="0"/>
           </a:p>

</xml_diff>